<commit_message>
Update the diagrams for record group
</commit_message>
<xml_diff>
--- a/images/backendEntitiesOverview.pptx
+++ b/images/backendEntitiesOverview.pptx
@@ -212,7 +212,7 @@
             <a:fld id="{5D8FA8FF-20DC-44E5-8C35-13EAF0A5698C}" type="datetimeFigureOut">
               <a:rPr lang="en-SG" smtClean="0"/>
               <a:pPr/>
-              <a:t>14/11/18</a:t>
+              <a:t>13/11/19</a:t>
             </a:fld>
             <a:endParaRPr lang="en-SG"/>
           </a:p>
@@ -661,7 +661,7 @@
             <a:fld id="{1D8BD707-D9CF-40AE-B4C6-C98DA3205C09}" type="datetimeFigureOut">
               <a:rPr lang="en-US" smtClean="0"/>
               <a:pPr/>
-              <a:t>11/14/18</a:t>
+              <a:t>11/13/19</a:t>
             </a:fld>
             <a:endParaRPr lang="en-US"/>
           </a:p>
@@ -826,7 +826,7 @@
             <a:fld id="{1D8BD707-D9CF-40AE-B4C6-C98DA3205C09}" type="datetimeFigureOut">
               <a:rPr lang="en-US" smtClean="0"/>
               <a:pPr/>
-              <a:t>11/14/18</a:t>
+              <a:t>11/13/19</a:t>
             </a:fld>
             <a:endParaRPr lang="en-US"/>
           </a:p>
@@ -1001,7 +1001,7 @@
             <a:fld id="{1D8BD707-D9CF-40AE-B4C6-C98DA3205C09}" type="datetimeFigureOut">
               <a:rPr lang="en-US" smtClean="0"/>
               <a:pPr/>
-              <a:t>11/14/18</a:t>
+              <a:t>11/13/19</a:t>
             </a:fld>
             <a:endParaRPr lang="en-US"/>
           </a:p>
@@ -1166,7 +1166,7 @@
             <a:fld id="{1D8BD707-D9CF-40AE-B4C6-C98DA3205C09}" type="datetimeFigureOut">
               <a:rPr lang="en-US" smtClean="0"/>
               <a:pPr/>
-              <a:t>11/14/18</a:t>
+              <a:t>11/13/19</a:t>
             </a:fld>
             <a:endParaRPr lang="en-US"/>
           </a:p>
@@ -1408,7 +1408,7 @@
             <a:fld id="{1D8BD707-D9CF-40AE-B4C6-C98DA3205C09}" type="datetimeFigureOut">
               <a:rPr lang="en-US" smtClean="0"/>
               <a:pPr/>
-              <a:t>11/14/18</a:t>
+              <a:t>11/13/19</a:t>
             </a:fld>
             <a:endParaRPr lang="en-US"/>
           </a:p>
@@ -1690,7 +1690,7 @@
             <a:fld id="{1D8BD707-D9CF-40AE-B4C6-C98DA3205C09}" type="datetimeFigureOut">
               <a:rPr lang="en-US" smtClean="0"/>
               <a:pPr/>
-              <a:t>11/14/18</a:t>
+              <a:t>11/13/19</a:t>
             </a:fld>
             <a:endParaRPr lang="en-US"/>
           </a:p>
@@ -2106,7 +2106,7 @@
             <a:fld id="{1D8BD707-D9CF-40AE-B4C6-C98DA3205C09}" type="datetimeFigureOut">
               <a:rPr lang="en-US" smtClean="0"/>
               <a:pPr/>
-              <a:t>11/14/18</a:t>
+              <a:t>11/13/19</a:t>
             </a:fld>
             <a:endParaRPr lang="en-US"/>
           </a:p>
@@ -2220,7 +2220,7 @@
             <a:fld id="{1D8BD707-D9CF-40AE-B4C6-C98DA3205C09}" type="datetimeFigureOut">
               <a:rPr lang="en-US" smtClean="0"/>
               <a:pPr/>
-              <a:t>11/14/18</a:t>
+              <a:t>11/13/19</a:t>
             </a:fld>
             <a:endParaRPr lang="en-US"/>
           </a:p>
@@ -2312,7 +2312,7 @@
             <a:fld id="{1D8BD707-D9CF-40AE-B4C6-C98DA3205C09}" type="datetimeFigureOut">
               <a:rPr lang="en-US" smtClean="0"/>
               <a:pPr/>
-              <a:t>11/14/18</a:t>
+              <a:t>11/13/19</a:t>
             </a:fld>
             <a:endParaRPr lang="en-US"/>
           </a:p>
@@ -2584,7 +2584,7 @@
             <a:fld id="{1D8BD707-D9CF-40AE-B4C6-C98DA3205C09}" type="datetimeFigureOut">
               <a:rPr lang="en-US" smtClean="0"/>
               <a:pPr/>
-              <a:t>11/14/18</a:t>
+              <a:t>11/13/19</a:t>
             </a:fld>
             <a:endParaRPr lang="en-US"/>
           </a:p>
@@ -2833,7 +2833,7 @@
             <a:fld id="{1D8BD707-D9CF-40AE-B4C6-C98DA3205C09}" type="datetimeFigureOut">
               <a:rPr lang="en-US" smtClean="0"/>
               <a:pPr/>
-              <a:t>11/14/18</a:t>
+              <a:t>11/13/19</a:t>
             </a:fld>
             <a:endParaRPr lang="en-US"/>
           </a:p>
@@ -3041,7 +3041,7 @@
             <a:fld id="{1D8BD707-D9CF-40AE-B4C6-C98DA3205C09}" type="datetimeFigureOut">
               <a:rPr lang="en-US" smtClean="0"/>
               <a:pPr/>
-              <a:t>11/14/18</a:t>
+              <a:t>11/13/19</a:t>
             </a:fld>
             <a:endParaRPr lang="en-US"/>
           </a:p>
@@ -3634,7 +3634,7 @@
         </p:nvSpPr>
         <p:spPr>
           <a:xfrm>
-            <a:off x="871847" y="3482487"/>
+            <a:off x="5310981" y="3764484"/>
             <a:ext cx="1600200" cy="396000"/>
           </a:xfrm>
           <a:prstGeom prst="roundRect">
@@ -3693,7 +3693,7 @@
         </p:nvSpPr>
         <p:spPr>
           <a:xfrm>
-            <a:off x="871847" y="4092087"/>
+            <a:off x="2832974" y="3727477"/>
             <a:ext cx="1600200" cy="396000"/>
           </a:xfrm>
           <a:prstGeom prst="roundRect">
@@ -3752,7 +3752,7 @@
         </p:nvSpPr>
         <p:spPr>
           <a:xfrm>
-            <a:off x="871847" y="4926502"/>
+            <a:off x="578571" y="4926502"/>
             <a:ext cx="2153134" cy="396000"/>
           </a:xfrm>
           <a:prstGeom prst="roundRect">
@@ -3811,7 +3811,7 @@
         </p:nvSpPr>
         <p:spPr>
           <a:xfrm>
-            <a:off x="5234781" y="4965948"/>
+            <a:off x="5262022" y="4926502"/>
             <a:ext cx="2787069" cy="396000"/>
           </a:xfrm>
           <a:prstGeom prst="roundRect">
@@ -3910,10 +3910,10 @@
         </p:nvCxnSpPr>
         <p:spPr>
           <a:xfrm>
-            <a:off x="3024981" y="5124502"/>
-            <a:ext cx="2209800" cy="39446"/>
-          </a:xfrm>
-          <a:prstGeom prst="bentConnector3">
+            <a:off x="2731705" y="5124502"/>
+            <a:ext cx="2530317" cy="0"/>
+          </a:xfrm>
+          <a:prstGeom prst="straightConnector1">
             <a:avLst/>
           </a:prstGeom>
           <a:ln>
@@ -3959,10 +3959,9 @@
           <a:lstStyle/>
           <a:p>
             <a:r>
-              <a:rPr lang="en-US" smtClean="0"/>
+              <a:rPr lang="en-US"/>
               <a:t>1</a:t>
             </a:r>
-            <a:endParaRPr lang="en-US"/>
           </a:p>
         </p:txBody>
       </p:sp>
@@ -3989,10 +3988,9 @@
           <a:lstStyle/>
           <a:p>
             <a:r>
-              <a:rPr lang="en-US" smtClean="0"/>
+              <a:rPr lang="en-US"/>
               <a:t>0..*</a:t>
             </a:r>
-            <a:endParaRPr lang="en-US"/>
           </a:p>
         </p:txBody>
       </p:sp>
@@ -4019,10 +4017,9 @@
           <a:lstStyle/>
           <a:p>
             <a:r>
-              <a:rPr lang="en-US" smtClean="0"/>
+              <a:rPr lang="en-US"/>
               <a:t>0..*</a:t>
             </a:r>
-            <a:endParaRPr lang="en-US"/>
           </a:p>
         </p:txBody>
       </p:sp>
@@ -4050,13 +4047,8 @@
           <a:p>
             <a:r>
               <a:rPr lang="en-US" dirty="0"/>
-              <a:t>1</a:t>
-            </a:r>
-            <a:r>
-              <a:rPr lang="en-US" dirty="0" smtClean="0"/>
-              <a:t>..*</a:t>
-            </a:r>
-            <a:endParaRPr lang="en-US" dirty="0"/>
+              <a:t>1..*</a:t>
+            </a:r>
           </a:p>
         </p:txBody>
       </p:sp>
@@ -4084,13 +4076,461 @@
           <a:p>
             <a:r>
               <a:rPr lang="en-US" dirty="0"/>
+              <a:t>1..*</a:t>
+            </a:r>
+          </a:p>
+        </p:txBody>
+      </p:sp>
+      <p:sp>
+        <p:nvSpPr>
+          <p:cNvPr id="17" name="Rounded Rectangle 16">
+            <a:extLst>
+              <a:ext uri="{FF2B5EF4-FFF2-40B4-BE49-F238E27FC236}">
+                <a16:creationId xmlns:a16="http://schemas.microsoft.com/office/drawing/2014/main" id="{8E576F3D-B358-BB4F-8902-A19A9EE2496C}"/>
+              </a:ext>
+            </a:extLst>
+          </p:cNvPr>
+          <p:cNvSpPr/>
+          <p:nvPr/>
+        </p:nvSpPr>
+        <p:spPr>
+          <a:xfrm>
+            <a:off x="868878" y="2698494"/>
+            <a:ext cx="1600200" cy="396000"/>
+          </a:xfrm>
+          <a:prstGeom prst="roundRect">
+            <a:avLst>
+              <a:gd name="adj" fmla="val 9190"/>
+            </a:avLst>
+          </a:prstGeom>
+          <a:solidFill>
+            <a:schemeClr val="accent5">
+              <a:lumMod val="60000"/>
+              <a:lumOff val="40000"/>
+            </a:schemeClr>
+          </a:solidFill>
+          <a:ln>
+            <a:solidFill>
+              <a:schemeClr val="accent5">
+                <a:lumMod val="75000"/>
+              </a:schemeClr>
+            </a:solidFill>
+          </a:ln>
+        </p:spPr>
+        <p:style>
+          <a:lnRef idx="2">
+            <a:schemeClr val="accent1">
+              <a:shade val="50000"/>
+            </a:schemeClr>
+          </a:lnRef>
+          <a:fillRef idx="1">
+            <a:schemeClr val="accent1"/>
+          </a:fillRef>
+          <a:effectRef idx="0">
+            <a:schemeClr val="accent1"/>
+          </a:effectRef>
+          <a:fontRef idx="minor">
+            <a:schemeClr val="lt1"/>
+          </a:fontRef>
+        </p:style>
+        <p:txBody>
+          <a:bodyPr vert="horz" rtlCol="0" anchor="t" anchorCtr="0"/>
+          <a:lstStyle/>
+          <a:p>
+            <a:pPr algn="ctr"/>
+            <a:r>
+              <a:rPr lang="en-US" sz="1600" b="1" dirty="0" err="1"/>
+              <a:t>RecordGroup</a:t>
+            </a:r>
+            <a:endParaRPr lang="en-SG" sz="1600" b="1" dirty="0"/>
+          </a:p>
+        </p:txBody>
+      </p:sp>
+      <p:cxnSp>
+        <p:nvCxnSpPr>
+          <p:cNvPr id="18" name="Elbow Connector 17">
+            <a:extLst>
+              <a:ext uri="{FF2B5EF4-FFF2-40B4-BE49-F238E27FC236}">
+                <a16:creationId xmlns:a16="http://schemas.microsoft.com/office/drawing/2014/main" id="{B4DB053D-D768-C941-9924-4B3E6A8046A9}"/>
+              </a:ext>
+            </a:extLst>
+          </p:cNvPr>
+          <p:cNvCxnSpPr>
+            <a:cxnSpLocks/>
+            <a:stCxn id="46" idx="2"/>
+            <a:endCxn id="17" idx="0"/>
+          </p:cNvCxnSpPr>
+          <p:nvPr/>
+        </p:nvCxnSpPr>
+        <p:spPr>
+          <a:xfrm rot="5400000">
+            <a:off x="1299677" y="2326224"/>
+            <a:ext cx="741572" cy="2969"/>
+          </a:xfrm>
+          <a:prstGeom prst="bentConnector3">
+            <a:avLst>
+              <a:gd name="adj1" fmla="val 50000"/>
+            </a:avLst>
+          </a:prstGeom>
+          <a:ln>
+            <a:headEnd type="none" w="med" len="med"/>
+            <a:tailEnd type="none" w="med" len="med"/>
+          </a:ln>
+        </p:spPr>
+        <p:style>
+          <a:lnRef idx="3">
+            <a:schemeClr val="accent5"/>
+          </a:lnRef>
+          <a:fillRef idx="0">
+            <a:schemeClr val="accent5"/>
+          </a:fillRef>
+          <a:effectRef idx="2">
+            <a:schemeClr val="accent5"/>
+          </a:effectRef>
+          <a:fontRef idx="minor">
+            <a:schemeClr val="tx1"/>
+          </a:fontRef>
+        </p:style>
+      </p:cxnSp>
+      <p:cxnSp>
+        <p:nvCxnSpPr>
+          <p:cNvPr id="21" name="Elbow Connector 20">
+            <a:extLst>
+              <a:ext uri="{FF2B5EF4-FFF2-40B4-BE49-F238E27FC236}">
+                <a16:creationId xmlns:a16="http://schemas.microsoft.com/office/drawing/2014/main" id="{98E0518A-E9B0-BF41-8674-1E86FC103EB4}"/>
+              </a:ext>
+            </a:extLst>
+          </p:cNvPr>
+          <p:cNvCxnSpPr>
+            <a:cxnSpLocks/>
+            <a:stCxn id="17" idx="2"/>
+            <a:endCxn id="56" idx="0"/>
+          </p:cNvCxnSpPr>
+          <p:nvPr/>
+        </p:nvCxnSpPr>
+        <p:spPr>
+          <a:xfrm flipH="1">
+            <a:off x="1655138" y="3094494"/>
+            <a:ext cx="13840" cy="1832008"/>
+          </a:xfrm>
+          <a:prstGeom prst="straightConnector1">
+            <a:avLst/>
+          </a:prstGeom>
+          <a:ln>
+            <a:headEnd type="none" w="med" len="med"/>
+            <a:tailEnd type="none" w="med" len="med"/>
+          </a:ln>
+        </p:spPr>
+        <p:style>
+          <a:lnRef idx="3">
+            <a:schemeClr val="accent5"/>
+          </a:lnRef>
+          <a:fillRef idx="0">
+            <a:schemeClr val="accent5"/>
+          </a:fillRef>
+          <a:effectRef idx="2">
+            <a:schemeClr val="accent5"/>
+          </a:effectRef>
+          <a:fontRef idx="minor">
+            <a:schemeClr val="tx1"/>
+          </a:fontRef>
+        </p:style>
+      </p:cxnSp>
+      <p:cxnSp>
+        <p:nvCxnSpPr>
+          <p:cNvPr id="22" name="Elbow Connector 21">
+            <a:extLst>
+              <a:ext uri="{FF2B5EF4-FFF2-40B4-BE49-F238E27FC236}">
+                <a16:creationId xmlns:a16="http://schemas.microsoft.com/office/drawing/2014/main" id="{B1FFE51D-647D-394D-908D-AC79E577AF3D}"/>
+              </a:ext>
+            </a:extLst>
+          </p:cNvPr>
+          <p:cNvCxnSpPr>
+            <a:cxnSpLocks/>
+            <a:stCxn id="17" idx="3"/>
+            <a:endCxn id="55" idx="0"/>
+          </p:cNvCxnSpPr>
+          <p:nvPr/>
+        </p:nvCxnSpPr>
+        <p:spPr>
+          <a:xfrm>
+            <a:off x="2469078" y="2896494"/>
+            <a:ext cx="1163996" cy="830983"/>
+          </a:xfrm>
+          <a:prstGeom prst="bentConnector2">
+            <a:avLst/>
+          </a:prstGeom>
+          <a:ln>
+            <a:headEnd type="none" w="med" len="med"/>
+            <a:tailEnd type="none" w="med" len="med"/>
+          </a:ln>
+        </p:spPr>
+        <p:style>
+          <a:lnRef idx="3">
+            <a:schemeClr val="accent5"/>
+          </a:lnRef>
+          <a:fillRef idx="0">
+            <a:schemeClr val="accent5"/>
+          </a:fillRef>
+          <a:effectRef idx="2">
+            <a:schemeClr val="accent5"/>
+          </a:effectRef>
+          <a:fontRef idx="minor">
+            <a:schemeClr val="tx1"/>
+          </a:fontRef>
+        </p:style>
+      </p:cxnSp>
+      <p:cxnSp>
+        <p:nvCxnSpPr>
+          <p:cNvPr id="23" name="Elbow Connector 22">
+            <a:extLst>
+              <a:ext uri="{FF2B5EF4-FFF2-40B4-BE49-F238E27FC236}">
+                <a16:creationId xmlns:a16="http://schemas.microsoft.com/office/drawing/2014/main" id="{11554E2C-B045-E04E-A56A-C47BBB22B7E9}"/>
+              </a:ext>
+            </a:extLst>
+          </p:cNvPr>
+          <p:cNvCxnSpPr>
+            <a:cxnSpLocks/>
+            <a:stCxn id="17" idx="3"/>
+            <a:endCxn id="53" idx="0"/>
+          </p:cNvCxnSpPr>
+          <p:nvPr/>
+        </p:nvCxnSpPr>
+        <p:spPr>
+          <a:xfrm>
+            <a:off x="2469078" y="2896494"/>
+            <a:ext cx="3642003" cy="867990"/>
+          </a:xfrm>
+          <a:prstGeom prst="bentConnector2">
+            <a:avLst/>
+          </a:prstGeom>
+          <a:ln>
+            <a:headEnd type="none" w="med" len="med"/>
+            <a:tailEnd type="none" w="med" len="med"/>
+          </a:ln>
+        </p:spPr>
+        <p:style>
+          <a:lnRef idx="3">
+            <a:schemeClr val="accent5"/>
+          </a:lnRef>
+          <a:fillRef idx="0">
+            <a:schemeClr val="accent5"/>
+          </a:fillRef>
+          <a:effectRef idx="2">
+            <a:schemeClr val="accent5"/>
+          </a:effectRef>
+          <a:fontRef idx="minor">
+            <a:schemeClr val="tx1"/>
+          </a:fontRef>
+        </p:style>
+      </p:cxnSp>
+      <p:sp>
+        <p:nvSpPr>
+          <p:cNvPr id="30" name="TextBox 29">
+            <a:extLst>
+              <a:ext uri="{FF2B5EF4-FFF2-40B4-BE49-F238E27FC236}">
+                <a16:creationId xmlns:a16="http://schemas.microsoft.com/office/drawing/2014/main" id="{CF7029CE-A36B-9348-B959-5FAF390DBF2D}"/>
+              </a:ext>
+            </a:extLst>
+          </p:cNvPr>
+          <p:cNvSpPr txBox="1"/>
+          <p:nvPr/>
+        </p:nvSpPr>
+        <p:spPr>
+          <a:xfrm>
+            <a:off x="1668978" y="1948551"/>
+            <a:ext cx="295274" cy="353943"/>
+          </a:xfrm>
+          <a:prstGeom prst="rect">
+            <a:avLst/>
+          </a:prstGeom>
+          <a:noFill/>
+        </p:spPr>
+        <p:txBody>
+          <a:bodyPr wrap="none" rtlCol="0">
+            <a:spAutoFit/>
+          </a:bodyPr>
+          <a:lstStyle/>
+          <a:p>
+            <a:r>
+              <a:rPr lang="en-US" dirty="0"/>
               <a:t>1</a:t>
             </a:r>
-            <a:r>
-              <a:rPr lang="en-US" dirty="0" smtClean="0"/>
-              <a:t>..*</a:t>
-            </a:r>
-            <a:endParaRPr lang="en-US" dirty="0"/>
+          </a:p>
+        </p:txBody>
+      </p:sp>
+      <p:sp>
+        <p:nvSpPr>
+          <p:cNvPr id="31" name="TextBox 30">
+            <a:extLst>
+              <a:ext uri="{FF2B5EF4-FFF2-40B4-BE49-F238E27FC236}">
+                <a16:creationId xmlns:a16="http://schemas.microsoft.com/office/drawing/2014/main" id="{A9017B26-0426-7240-900A-91EF5E655367}"/>
+              </a:ext>
+            </a:extLst>
+          </p:cNvPr>
+          <p:cNvSpPr txBox="1"/>
+          <p:nvPr/>
+        </p:nvSpPr>
+        <p:spPr>
+          <a:xfrm>
+            <a:off x="1678385" y="3150394"/>
+            <a:ext cx="295274" cy="353943"/>
+          </a:xfrm>
+          <a:prstGeom prst="rect">
+            <a:avLst/>
+          </a:prstGeom>
+          <a:noFill/>
+        </p:spPr>
+        <p:txBody>
+          <a:bodyPr wrap="none" rtlCol="0">
+            <a:spAutoFit/>
+          </a:bodyPr>
+          <a:lstStyle/>
+          <a:p>
+            <a:r>
+              <a:rPr lang="en-US" dirty="0"/>
+              <a:t>1</a:t>
+            </a:r>
+          </a:p>
+        </p:txBody>
+      </p:sp>
+      <p:sp>
+        <p:nvSpPr>
+          <p:cNvPr id="32" name="TextBox 31">
+            <a:extLst>
+              <a:ext uri="{FF2B5EF4-FFF2-40B4-BE49-F238E27FC236}">
+                <a16:creationId xmlns:a16="http://schemas.microsoft.com/office/drawing/2014/main" id="{275DD8F9-90FF-424C-B42E-E4FE308736DC}"/>
+              </a:ext>
+            </a:extLst>
+          </p:cNvPr>
+          <p:cNvSpPr txBox="1"/>
+          <p:nvPr/>
+        </p:nvSpPr>
+        <p:spPr>
+          <a:xfrm>
+            <a:off x="1668978" y="2360629"/>
+            <a:ext cx="295274" cy="353943"/>
+          </a:xfrm>
+          <a:prstGeom prst="rect">
+            <a:avLst/>
+          </a:prstGeom>
+          <a:noFill/>
+        </p:spPr>
+        <p:txBody>
+          <a:bodyPr wrap="none" rtlCol="0">
+            <a:spAutoFit/>
+          </a:bodyPr>
+          <a:lstStyle/>
+          <a:p>
+            <a:r>
+              <a:rPr lang="en-US"/>
+              <a:t>1</a:t>
+            </a:r>
+          </a:p>
+        </p:txBody>
+      </p:sp>
+      <p:sp>
+        <p:nvSpPr>
+          <p:cNvPr id="33" name="TextBox 32">
+            <a:extLst>
+              <a:ext uri="{FF2B5EF4-FFF2-40B4-BE49-F238E27FC236}">
+                <a16:creationId xmlns:a16="http://schemas.microsoft.com/office/drawing/2014/main" id="{D481DE2D-D71D-9B4B-BA52-F72818092B00}"/>
+              </a:ext>
+            </a:extLst>
+          </p:cNvPr>
+          <p:cNvSpPr txBox="1"/>
+          <p:nvPr/>
+        </p:nvSpPr>
+        <p:spPr>
+          <a:xfrm>
+            <a:off x="1662058" y="4562894"/>
+            <a:ext cx="295274" cy="353943"/>
+          </a:xfrm>
+          <a:prstGeom prst="rect">
+            <a:avLst/>
+          </a:prstGeom>
+          <a:noFill/>
+        </p:spPr>
+        <p:txBody>
+          <a:bodyPr wrap="none" rtlCol="0">
+            <a:spAutoFit/>
+          </a:bodyPr>
+          <a:lstStyle/>
+          <a:p>
+            <a:r>
+              <a:rPr lang="en-US" dirty="0"/>
+              <a:t>1</a:t>
+            </a:r>
+          </a:p>
+        </p:txBody>
+      </p:sp>
+      <p:sp>
+        <p:nvSpPr>
+          <p:cNvPr id="34" name="TextBox 33">
+            <a:extLst>
+              <a:ext uri="{FF2B5EF4-FFF2-40B4-BE49-F238E27FC236}">
+                <a16:creationId xmlns:a16="http://schemas.microsoft.com/office/drawing/2014/main" id="{C2AC3680-2EE1-4642-8351-C34F992541E6}"/>
+              </a:ext>
+            </a:extLst>
+          </p:cNvPr>
+          <p:cNvSpPr txBox="1"/>
+          <p:nvPr/>
+        </p:nvSpPr>
+        <p:spPr>
+          <a:xfrm>
+            <a:off x="6099722" y="3390878"/>
+            <a:ext cx="295274" cy="353943"/>
+          </a:xfrm>
+          <a:prstGeom prst="rect">
+            <a:avLst/>
+          </a:prstGeom>
+          <a:noFill/>
+        </p:spPr>
+        <p:txBody>
+          <a:bodyPr wrap="none" rtlCol="0">
+            <a:spAutoFit/>
+          </a:bodyPr>
+          <a:lstStyle/>
+          <a:p>
+            <a:r>
+              <a:rPr lang="en-US" dirty="0"/>
+              <a:t>1</a:t>
+            </a:r>
+          </a:p>
+        </p:txBody>
+      </p:sp>
+      <p:sp>
+        <p:nvSpPr>
+          <p:cNvPr id="35" name="TextBox 34">
+            <a:extLst>
+              <a:ext uri="{FF2B5EF4-FFF2-40B4-BE49-F238E27FC236}">
+                <a16:creationId xmlns:a16="http://schemas.microsoft.com/office/drawing/2014/main" id="{067AFFE5-CA84-784F-A6A8-902DD9E69DBF}"/>
+              </a:ext>
+            </a:extLst>
+          </p:cNvPr>
+          <p:cNvSpPr txBox="1"/>
+          <p:nvPr/>
+        </p:nvSpPr>
+        <p:spPr>
+          <a:xfrm>
+            <a:off x="3647725" y="3410541"/>
+            <a:ext cx="295274" cy="353943"/>
+          </a:xfrm>
+          <a:prstGeom prst="rect">
+            <a:avLst/>
+          </a:prstGeom>
+          <a:noFill/>
+        </p:spPr>
+        <p:txBody>
+          <a:bodyPr wrap="none" rtlCol="0">
+            <a:spAutoFit/>
+          </a:bodyPr>
+          <a:lstStyle/>
+          <a:p>
+            <a:r>
+              <a:rPr lang="en-US" dirty="0"/>
+              <a:t>1</a:t>
+            </a:r>
           </a:p>
         </p:txBody>
       </p:sp>

</xml_diff>